<commit_message>
Slides & Remove Unneccessary Project
Update Slide, Remove HistorySearchControl
</commit_message>
<xml_diff>
--- a/Slide/Search With Logical Operation.pptx
+++ b/Slide/Search With Logical Operation.pptx
@@ -5,7 +5,7 @@
     <p:sldMasterId id="2147483660" r:id="rId16"/>
   </p:sldMasterIdLst>
   <p:notesMasterIdLst>
-    <p:notesMasterId r:id="rId33"/>
+    <p:notesMasterId r:id="rId35"/>
   </p:notesMasterIdLst>
   <p:sldIdLst>
     <p:sldId id="256" r:id="rId17"/>
@@ -14,16 +14,18 @@
     <p:sldId id="259" r:id="rId20"/>
     <p:sldId id="272" r:id="rId21"/>
     <p:sldId id="260" r:id="rId22"/>
-    <p:sldId id="261" r:id="rId23"/>
-    <p:sldId id="262" r:id="rId24"/>
-    <p:sldId id="266" r:id="rId25"/>
-    <p:sldId id="269" r:id="rId26"/>
-    <p:sldId id="263" r:id="rId27"/>
-    <p:sldId id="268" r:id="rId28"/>
-    <p:sldId id="270" r:id="rId29"/>
-    <p:sldId id="271" r:id="rId30"/>
-    <p:sldId id="264" r:id="rId31"/>
-    <p:sldId id="265" r:id="rId32"/>
+    <p:sldId id="273" r:id="rId23"/>
+    <p:sldId id="261" r:id="rId24"/>
+    <p:sldId id="262" r:id="rId25"/>
+    <p:sldId id="266" r:id="rId26"/>
+    <p:sldId id="269" r:id="rId27"/>
+    <p:sldId id="263" r:id="rId28"/>
+    <p:sldId id="268" r:id="rId29"/>
+    <p:sldId id="270" r:id="rId30"/>
+    <p:sldId id="271" r:id="rId31"/>
+    <p:sldId id="264" r:id="rId32"/>
+    <p:sldId id="274" r:id="rId33"/>
+    <p:sldId id="265" r:id="rId34"/>
   </p:sldIdLst>
   <p:sldSz cx="12192000" cy="6858000"/>
   <p:notesSz cx="6858000" cy="9144000"/>
@@ -34979,7 +34981,7 @@
           <a:p>
             <a:fld id="{B0C7423B-5048-40D7-99A1-3894608C8947}" type="datetimeFigureOut">
               <a:rPr lang="en-US" smtClean="0"/>
-              <a:t>3/28/2017</a:t>
+              <a:t>4/10/2017</a:t>
             </a:fld>
             <a:endParaRPr lang="en-US"/>
           </a:p>
@@ -39577,6 +39579,192 @@
       </p:grpSpPr>
       <p:sp>
         <p:nvSpPr>
+          <p:cNvPr id="2" name="Title 1"/>
+          <p:cNvSpPr>
+            <a:spLocks noGrp="1"/>
+          </p:cNvSpPr>
+          <p:nvPr>
+            <p:ph type="title"/>
+          </p:nvPr>
+        </p:nvSpPr>
+        <p:spPr/>
+        <p:txBody>
+          <a:bodyPr/>
+          <a:lstStyle/>
+          <a:p>
+            <a:r>
+              <a:rPr lang="en-US" dirty="0"/>
+              <a:t>Background knowledge</a:t>
+            </a:r>
+          </a:p>
+        </p:txBody>
+      </p:sp>
+      <p:sp>
+        <p:nvSpPr>
+          <p:cNvPr id="4" name="Content Placeholder 2"/>
+          <p:cNvSpPr>
+            <a:spLocks noGrp="1"/>
+          </p:cNvSpPr>
+          <p:nvPr>
+            <p:ph idx="1"/>
+          </p:nvPr>
+        </p:nvSpPr>
+        <p:spPr>
+          <a:xfrm>
+            <a:off x="477464" y="1044422"/>
+            <a:ext cx="5316846" cy="672412"/>
+          </a:xfrm>
+        </p:spPr>
+        <p:txBody>
+          <a:bodyPr/>
+          <a:lstStyle/>
+          <a:p>
+            <a:pPr>
+              <a:buFont typeface="Wingdings" panose="05000000000000000000" pitchFamily="2" charset="2"/>
+              <a:buChar char="q"/>
+            </a:pPr>
+            <a:r>
+              <a:rPr lang="en-US" dirty="0"/>
+              <a:t>Object Oriented Programming</a:t>
+            </a:r>
+          </a:p>
+        </p:txBody>
+      </p:sp>
+      <p:graphicFrame>
+        <p:nvGraphicFramePr>
+          <p:cNvPr id="5" name="Diagram 4"/>
+          <p:cNvGraphicFramePr/>
+          <p:nvPr>
+            <p:extLst>
+              <p:ext uri="{D42A27DB-BD31-4B8C-83A1-F6EECF244321}">
+                <p14:modId xmlns:p14="http://schemas.microsoft.com/office/powerpoint/2010/main" val="2418033946"/>
+              </p:ext>
+            </p:extLst>
+          </p:nvPr>
+        </p:nvGraphicFramePr>
+        <p:xfrm>
+          <a:off x="477464" y="2011680"/>
+          <a:ext cx="5486400" cy="3657600"/>
+        </p:xfrm>
+        <a:graphic>
+          <a:graphicData uri="http://schemas.openxmlformats.org/drawingml/2006/diagram">
+            <dgm:relIds xmlns:dgm="http://schemas.openxmlformats.org/drawingml/2006/diagram" xmlns:r="http://schemas.openxmlformats.org/officeDocument/2006/relationships" r:dm="rId2" r:lo="rId3" r:qs="rId4" r:cs="rId5"/>
+          </a:graphicData>
+        </a:graphic>
+      </p:graphicFrame>
+      <p:sp>
+        <p:nvSpPr>
+          <p:cNvPr id="8" name="Thought Bubble: Cloud 7"/>
+          <p:cNvSpPr/>
+          <p:nvPr/>
+        </p:nvSpPr>
+        <p:spPr>
+          <a:xfrm>
+            <a:off x="7408507" y="946338"/>
+            <a:ext cx="3312368" cy="2286607"/>
+          </a:xfrm>
+          <a:prstGeom prst="cloudCallout">
+            <a:avLst>
+              <a:gd name="adj1" fmla="val -26633"/>
+              <a:gd name="adj2" fmla="val 68621"/>
+            </a:avLst>
+          </a:prstGeom>
+        </p:spPr>
+        <p:style>
+          <a:lnRef idx="2">
+            <a:schemeClr val="accent1">
+              <a:shade val="50000"/>
+            </a:schemeClr>
+          </a:lnRef>
+          <a:fillRef idx="1">
+            <a:schemeClr val="accent1"/>
+          </a:fillRef>
+          <a:effectRef idx="0">
+            <a:schemeClr val="accent1"/>
+          </a:effectRef>
+          <a:fontRef idx="minor">
+            <a:schemeClr val="lt1"/>
+          </a:fontRef>
+        </p:style>
+        <p:txBody>
+          <a:bodyPr rtlCol="0" anchor="ctr"/>
+          <a:lstStyle/>
+          <a:p>
+            <a:pPr marL="285750" indent="-285750">
+              <a:buFont typeface="Wingdings" panose="05000000000000000000" pitchFamily="2" charset="2"/>
+              <a:buChar char="ü"/>
+            </a:pPr>
+            <a:r>
+              <a:rPr lang="en-US" sz="1400" dirty="0">
+                <a:latin typeface="Century Gothic" panose="020B0502020202020204" pitchFamily="34" charset="0"/>
+              </a:rPr>
+              <a:t>Condition: text, date time, number…</a:t>
+            </a:r>
+          </a:p>
+        </p:txBody>
+      </p:sp>
+      <p:pic>
+        <p:nvPicPr>
+          <p:cNvPr id="9" name="Picture 8"/>
+          <p:cNvPicPr>
+            <a:picLocks noChangeAspect="1"/>
+          </p:cNvPicPr>
+          <p:nvPr/>
+        </p:nvPicPr>
+        <p:blipFill>
+          <a:blip r:embed="rId7">
+            <a:extLst>
+              <a:ext uri="{28A0092B-C50C-407E-A947-70E740481C1C}">
+                <a14:useLocalDpi xmlns:a14="http://schemas.microsoft.com/office/drawing/2010/main" val="0"/>
+              </a:ext>
+            </a:extLst>
+          </a:blip>
+          <a:stretch>
+            <a:fillRect/>
+          </a:stretch>
+        </p:blipFill>
+        <p:spPr>
+          <a:xfrm>
+            <a:off x="6323847" y="3453486"/>
+            <a:ext cx="2362200" cy="2362200"/>
+          </a:xfrm>
+          <a:prstGeom prst="rect">
+            <a:avLst/>
+          </a:prstGeom>
+        </p:spPr>
+      </p:pic>
+    </p:spTree>
+    <p:extLst>
+      <p:ext uri="{BB962C8B-B14F-4D97-AF65-F5344CB8AC3E}">
+        <p14:creationId xmlns:p14="http://schemas.microsoft.com/office/powerpoint/2010/main" val="4060563675"/>
+      </p:ext>
+    </p:extLst>
+  </p:cSld>
+  <p:clrMapOvr>
+    <a:masterClrMapping/>
+  </p:clrMapOvr>
+</p:sld>
+</file>
+
+<file path=ppt/slides/slide11.xml><?xml version="1.0" encoding="utf-8"?>
+<p:sld xmlns:a="http://schemas.openxmlformats.org/drawingml/2006/main" xmlns:r="http://schemas.openxmlformats.org/officeDocument/2006/relationships" xmlns:p="http://schemas.openxmlformats.org/presentationml/2006/main">
+  <p:cSld>
+    <p:spTree>
+      <p:nvGrpSpPr>
+        <p:cNvPr id="1" name=""/>
+        <p:cNvGrpSpPr/>
+        <p:nvPr/>
+      </p:nvGrpSpPr>
+      <p:grpSpPr>
+        <a:xfrm>
+          <a:off x="0" y="0"/>
+          <a:ext cx="0" cy="0"/>
+          <a:chOff x="0" y="0"/>
+          <a:chExt cx="0" cy="0"/>
+        </a:xfrm>
+      </p:grpSpPr>
+      <p:sp>
+        <p:nvSpPr>
           <p:cNvPr id="3" name="Content Placeholder 2"/>
           <p:cNvSpPr>
             <a:spLocks noGrp="1"/>
@@ -39670,7 +39858,7 @@
 </p:sld>
 </file>
 
-<file path=ppt/slides/slide11.xml><?xml version="1.0" encoding="utf-8"?>
+<file path=ppt/slides/slide12.xml><?xml version="1.0" encoding="utf-8"?>
 <p:sld xmlns:a="http://schemas.openxmlformats.org/drawingml/2006/main" xmlns:r="http://schemas.openxmlformats.org/officeDocument/2006/relationships" xmlns:p="http://schemas.openxmlformats.org/presentationml/2006/main">
   <p:cSld>
     <p:spTree>
@@ -40113,7 +40301,7 @@
 </p:sld>
 </file>
 
-<file path=ppt/slides/slide12.xml><?xml version="1.0" encoding="utf-8"?>
+<file path=ppt/slides/slide13.xml><?xml version="1.0" encoding="utf-8"?>
 <p:sld xmlns:a="http://schemas.openxmlformats.org/drawingml/2006/main" xmlns:r="http://schemas.openxmlformats.org/officeDocument/2006/relationships" xmlns:p="http://schemas.openxmlformats.org/presentationml/2006/main">
   <p:cSld>
     <p:spTree>
@@ -40677,7 +40865,7 @@
 </p:sld>
 </file>
 
-<file path=ppt/slides/slide13.xml><?xml version="1.0" encoding="utf-8"?>
+<file path=ppt/slides/slide14.xml><?xml version="1.0" encoding="utf-8"?>
 <p:sld xmlns:a="http://schemas.openxmlformats.org/drawingml/2006/main" xmlns:r="http://schemas.openxmlformats.org/officeDocument/2006/relationships" xmlns:p="http://schemas.openxmlformats.org/presentationml/2006/main">
   <p:cSld>
     <p:spTree>
@@ -41211,7 +41399,7 @@
 </p:sld>
 </file>
 
-<file path=ppt/slides/slide14.xml><?xml version="1.0" encoding="utf-8"?>
+<file path=ppt/slides/slide15.xml><?xml version="1.0" encoding="utf-8"?>
 <p:sld xmlns:a="http://schemas.openxmlformats.org/drawingml/2006/main" xmlns:r="http://schemas.openxmlformats.org/officeDocument/2006/relationships" xmlns:p="http://schemas.openxmlformats.org/presentationml/2006/main">
   <p:cSld>
     <p:spTree>
@@ -41326,7 +41514,7 @@
 </p:sld>
 </file>
 
-<file path=ppt/slides/slide15.xml><?xml version="1.0" encoding="utf-8"?>
+<file path=ppt/slides/slide16.xml><?xml version="1.0" encoding="utf-8"?>
 <p:sld xmlns:a="http://schemas.openxmlformats.org/drawingml/2006/main" xmlns:r="http://schemas.openxmlformats.org/officeDocument/2006/relationships" xmlns:p="http://schemas.openxmlformats.org/presentationml/2006/main">
   <p:cSld>
     <p:spTree>
@@ -41375,7 +41563,7 @@
       </p:sp>
       <p:pic>
         <p:nvPicPr>
-          <p:cNvPr id="5" name="Picture 4"/>
+          <p:cNvPr id="3" name="Picture 2"/>
           <p:cNvPicPr>
             <a:picLocks noChangeAspect="1"/>
           </p:cNvPicPr>
@@ -41389,8 +41577,8 @@
         </p:blipFill>
         <p:spPr>
           <a:xfrm>
-            <a:off x="2800383" y="974822"/>
-            <a:ext cx="7046927" cy="5034797"/>
+            <a:off x="2536097" y="964875"/>
+            <a:ext cx="6826017" cy="4876964"/>
           </a:xfrm>
           <a:prstGeom prst="rect">
             <a:avLst/>
@@ -41410,7 +41598,89 @@
 </p:sld>
 </file>
 
-<file path=ppt/slides/slide16.xml><?xml version="1.0" encoding="utf-8"?>
+<file path=ppt/slides/slide17.xml><?xml version="1.0" encoding="utf-8"?>
+<p:sld xmlns:a="http://schemas.openxmlformats.org/drawingml/2006/main" xmlns:r="http://schemas.openxmlformats.org/officeDocument/2006/relationships" xmlns:p="http://schemas.openxmlformats.org/presentationml/2006/main">
+  <p:cSld>
+    <p:spTree>
+      <p:nvGrpSpPr>
+        <p:cNvPr id="1" name=""/>
+        <p:cNvGrpSpPr/>
+        <p:nvPr/>
+      </p:nvGrpSpPr>
+      <p:grpSpPr>
+        <a:xfrm>
+          <a:off x="0" y="0"/>
+          <a:ext cx="0" cy="0"/>
+          <a:chOff x="0" y="0"/>
+          <a:chExt cx="0" cy="0"/>
+        </a:xfrm>
+      </p:grpSpPr>
+      <p:sp>
+        <p:nvSpPr>
+          <p:cNvPr id="2" name="Title 1"/>
+          <p:cNvSpPr>
+            <a:spLocks noGrp="1"/>
+          </p:cNvSpPr>
+          <p:nvPr>
+            <p:ph type="title"/>
+          </p:nvPr>
+        </p:nvSpPr>
+        <p:spPr/>
+        <p:txBody>
+          <a:bodyPr/>
+          <a:lstStyle/>
+          <a:p>
+            <a:r>
+              <a:rPr lang="en-US" dirty="0"/>
+              <a:t>Question &amp; Answer</a:t>
+            </a:r>
+          </a:p>
+        </p:txBody>
+      </p:sp>
+      <p:pic>
+        <p:nvPicPr>
+          <p:cNvPr id="7" name="Picture 6"/>
+          <p:cNvPicPr>
+            <a:picLocks noChangeAspect="1"/>
+          </p:cNvPicPr>
+          <p:nvPr/>
+        </p:nvPicPr>
+        <p:blipFill>
+          <a:blip r:embed="rId2">
+            <a:extLst>
+              <a:ext uri="{28A0092B-C50C-407E-A947-70E740481C1C}">
+                <a14:useLocalDpi xmlns:a14="http://schemas.microsoft.com/office/drawing/2010/main" val="0"/>
+              </a:ext>
+            </a:extLst>
+          </a:blip>
+          <a:stretch>
+            <a:fillRect/>
+          </a:stretch>
+        </p:blipFill>
+        <p:spPr>
+          <a:xfrm>
+            <a:off x="3279397" y="817227"/>
+            <a:ext cx="5461932" cy="5461932"/>
+          </a:xfrm>
+          <a:prstGeom prst="rect">
+            <a:avLst/>
+          </a:prstGeom>
+        </p:spPr>
+      </p:pic>
+    </p:spTree>
+    <p:extLst>
+      <p:ext uri="{BB962C8B-B14F-4D97-AF65-F5344CB8AC3E}">
+        <p14:creationId xmlns:p14="http://schemas.microsoft.com/office/powerpoint/2010/main" val="2942191141"/>
+      </p:ext>
+    </p:extLst>
+  </p:cSld>
+  <p:clrMapOvr>
+    <a:masterClrMapping/>
+  </p:clrMapOvr>
+</p:sld>
+</file>
+
+<file path=ppt/slides/slide18.xml><?xml version="1.0" encoding="utf-8"?>
 <p:sld xmlns:a="http://schemas.openxmlformats.org/drawingml/2006/main" xmlns:r="http://schemas.openxmlformats.org/officeDocument/2006/relationships" xmlns:p="http://schemas.openxmlformats.org/presentationml/2006/main">
   <p:cSld>
     <p:spTree>
@@ -41538,7 +41808,13 @@
           <a:p>
             <a:r>
               <a:rPr lang="en-US" dirty="0"/>
-              <a:t>Benefits of logical operation search.</a:t>
+              <a:t>Benefits of search with logical operation.</a:t>
+            </a:r>
+          </a:p>
+          <a:p>
+            <a:r>
+              <a:rPr lang="en-US" dirty="0"/>
+              <a:t>Practical application.</a:t>
             </a:r>
           </a:p>
           <a:p>
@@ -41697,7 +41973,7 @@
             </a:pPr>
             <a:r>
               <a:rPr lang="en-US" dirty="0"/>
-              <a:t>Search condition are usually not saved to reuse in the feature</a:t>
+              <a:t>Search condition are usually not saved to reuse in the future.</a:t>
             </a:r>
           </a:p>
         </p:txBody>
@@ -42556,7 +42832,7 @@
           <a:graphicData uri="http://schemas.openxmlformats.org/presentationml/2006/ole">
             <mc:AlternateContent xmlns:mc="http://schemas.openxmlformats.org/markup-compatibility/2006">
               <mc:Choice xmlns:v="urn:schemas-microsoft-com:vml" Requires="v">
-                <p:oleObj spid="_x0000_s1047" name="Image" r:id="rId3" imgW="2996640" imgH="2996640" progId="Photoshop.Image.18">
+                <p:oleObj spid="_x0000_s1064" name="Image" r:id="rId3" imgW="2996640" imgH="2996640" progId="Photoshop.Image.18">
                   <p:embed/>
                 </p:oleObj>
               </mc:Choice>
@@ -43097,6 +43373,160 @@
 </file>
 
 <file path=ppt/slides/slide7.xml><?xml version="1.0" encoding="utf-8"?>
+<p:sld xmlns:a="http://schemas.openxmlformats.org/drawingml/2006/main" xmlns:r="http://schemas.openxmlformats.org/officeDocument/2006/relationships" xmlns:p="http://schemas.openxmlformats.org/presentationml/2006/main">
+  <p:cSld>
+    <p:spTree>
+      <p:nvGrpSpPr>
+        <p:cNvPr id="1" name=""/>
+        <p:cNvGrpSpPr/>
+        <p:nvPr/>
+      </p:nvGrpSpPr>
+      <p:grpSpPr>
+        <a:xfrm>
+          <a:off x="0" y="0"/>
+          <a:ext cx="0" cy="0"/>
+          <a:chOff x="0" y="0"/>
+          <a:chExt cx="0" cy="0"/>
+        </a:xfrm>
+      </p:grpSpPr>
+      <p:sp>
+        <p:nvSpPr>
+          <p:cNvPr id="2" name="Title 1"/>
+          <p:cNvSpPr>
+            <a:spLocks noGrp="1"/>
+          </p:cNvSpPr>
+          <p:nvPr>
+            <p:ph type="title"/>
+          </p:nvPr>
+        </p:nvSpPr>
+        <p:spPr/>
+        <p:txBody>
+          <a:bodyPr/>
+          <a:lstStyle/>
+          <a:p>
+            <a:r>
+              <a:rPr lang="en-US" dirty="0"/>
+              <a:t>Practical application.</a:t>
+            </a:r>
+          </a:p>
+        </p:txBody>
+      </p:sp>
+      <p:sp>
+        <p:nvSpPr>
+          <p:cNvPr id="3" name="Content Placeholder 2"/>
+          <p:cNvSpPr>
+            <a:spLocks noGrp="1"/>
+          </p:cNvSpPr>
+          <p:nvPr>
+            <p:ph idx="1"/>
+          </p:nvPr>
+        </p:nvSpPr>
+        <p:spPr>
+          <a:xfrm>
+            <a:off x="477463" y="1044421"/>
+            <a:ext cx="10981897" cy="3007462"/>
+          </a:xfrm>
+        </p:spPr>
+        <p:txBody>
+          <a:bodyPr/>
+          <a:lstStyle/>
+          <a:p>
+            <a:pPr>
+              <a:buFont typeface="Wingdings" panose="05000000000000000000" pitchFamily="2" charset="2"/>
+              <a:buChar char="q"/>
+            </a:pPr>
+            <a:r>
+              <a:rPr lang="en-US" dirty="0"/>
+              <a:t>Patent Explorer – FREONTEO project:</a:t>
+            </a:r>
+          </a:p>
+          <a:p>
+            <a:pPr lvl="1">
+              <a:buFont typeface="Arial" panose="020B0604020202020204" pitchFamily="34" charset="0"/>
+              <a:buChar char="•"/>
+            </a:pPr>
+            <a:r>
+              <a:rPr lang="en-US" dirty="0"/>
+              <a:t>Allow client find any patent information by patent’s content, number, publish date,…as simple search condition.</a:t>
+            </a:r>
+          </a:p>
+          <a:p>
+            <a:pPr lvl="1">
+              <a:buFont typeface="Arial" panose="020B0604020202020204" pitchFamily="34" charset="0"/>
+              <a:buChar char="•"/>
+            </a:pPr>
+            <a:r>
+              <a:rPr lang="en-US" dirty="0"/>
+              <a:t>Combine many simple conditions to find exactly what client want by operator.</a:t>
+            </a:r>
+          </a:p>
+          <a:p>
+            <a:pPr marL="457200" lvl="1" indent="0">
+              <a:buNone/>
+            </a:pPr>
+            <a:r>
+              <a:rPr lang="ja-JP" altLang="en-US" dirty="0">
+                <a:solidFill>
+                  <a:srgbClr val="FF0000"/>
+                </a:solidFill>
+              </a:rPr>
+              <a:t>⇒ </a:t>
+            </a:r>
+            <a:r>
+              <a:rPr lang="en-US" dirty="0">
+                <a:solidFill>
+                  <a:srgbClr val="FF0000"/>
+                </a:solidFill>
+              </a:rPr>
+              <a:t>Considered a superior solution in terms of accuracy and comprehensiveness</a:t>
+            </a:r>
+          </a:p>
+        </p:txBody>
+      </p:sp>
+      <p:pic>
+        <p:nvPicPr>
+          <p:cNvPr id="8" name="Picture 7"/>
+          <p:cNvPicPr>
+            <a:picLocks noChangeAspect="1"/>
+          </p:cNvPicPr>
+          <p:nvPr/>
+        </p:nvPicPr>
+        <p:blipFill>
+          <a:blip r:embed="rId2">
+            <a:extLst>
+              <a:ext uri="{28A0092B-C50C-407E-A947-70E740481C1C}">
+                <a14:useLocalDpi xmlns:a14="http://schemas.microsoft.com/office/drawing/2010/main" val="0"/>
+              </a:ext>
+            </a:extLst>
+          </a:blip>
+          <a:stretch>
+            <a:fillRect/>
+          </a:stretch>
+        </p:blipFill>
+        <p:spPr>
+          <a:xfrm>
+            <a:off x="7135010" y="3813294"/>
+            <a:ext cx="4324350" cy="1114425"/>
+          </a:xfrm>
+          <a:prstGeom prst="rect">
+            <a:avLst/>
+          </a:prstGeom>
+        </p:spPr>
+      </p:pic>
+    </p:spTree>
+    <p:extLst>
+      <p:ext uri="{BB962C8B-B14F-4D97-AF65-F5344CB8AC3E}">
+        <p14:creationId xmlns:p14="http://schemas.microsoft.com/office/powerpoint/2010/main" val="4247086539"/>
+      </p:ext>
+    </p:extLst>
+  </p:cSld>
+  <p:clrMapOvr>
+    <a:masterClrMapping/>
+  </p:clrMapOvr>
+</p:sld>
+</file>
+
+<file path=ppt/slides/slide8.xml><?xml version="1.0" encoding="utf-8"?>
 <p:sld xmlns:a="http://schemas.openxmlformats.org/drawingml/2006/main" xmlns:r="http://schemas.openxmlformats.org/officeDocument/2006/relationships" xmlns:p="http://schemas.openxmlformats.org/presentationml/2006/main">
   <p:cSld>
     <p:spTree>
@@ -43831,7 +44261,7 @@
 </p:sld>
 </file>
 
-<file path=ppt/slides/slide8.xml><?xml version="1.0" encoding="utf-8"?>
+<file path=ppt/slides/slide9.xml><?xml version="1.0" encoding="utf-8"?>
 <p:sld xmlns:a="http://schemas.openxmlformats.org/drawingml/2006/main" xmlns:r="http://schemas.openxmlformats.org/officeDocument/2006/relationships" xmlns:p="http://schemas.openxmlformats.org/presentationml/2006/main">
   <p:cSld>
     <p:spTree>
@@ -44308,192 +44738,6 @@
     <p:extLst>
       <p:ext uri="{BB962C8B-B14F-4D97-AF65-F5344CB8AC3E}">
         <p14:creationId xmlns:p14="http://schemas.microsoft.com/office/powerpoint/2010/main" val="3728587640"/>
-      </p:ext>
-    </p:extLst>
-  </p:cSld>
-  <p:clrMapOvr>
-    <a:masterClrMapping/>
-  </p:clrMapOvr>
-</p:sld>
-</file>
-
-<file path=ppt/slides/slide9.xml><?xml version="1.0" encoding="utf-8"?>
-<p:sld xmlns:a="http://schemas.openxmlformats.org/drawingml/2006/main" xmlns:r="http://schemas.openxmlformats.org/officeDocument/2006/relationships" xmlns:p="http://schemas.openxmlformats.org/presentationml/2006/main">
-  <p:cSld>
-    <p:spTree>
-      <p:nvGrpSpPr>
-        <p:cNvPr id="1" name=""/>
-        <p:cNvGrpSpPr/>
-        <p:nvPr/>
-      </p:nvGrpSpPr>
-      <p:grpSpPr>
-        <a:xfrm>
-          <a:off x="0" y="0"/>
-          <a:ext cx="0" cy="0"/>
-          <a:chOff x="0" y="0"/>
-          <a:chExt cx="0" cy="0"/>
-        </a:xfrm>
-      </p:grpSpPr>
-      <p:sp>
-        <p:nvSpPr>
-          <p:cNvPr id="2" name="Title 1"/>
-          <p:cNvSpPr>
-            <a:spLocks noGrp="1"/>
-          </p:cNvSpPr>
-          <p:nvPr>
-            <p:ph type="title"/>
-          </p:nvPr>
-        </p:nvSpPr>
-        <p:spPr/>
-        <p:txBody>
-          <a:bodyPr/>
-          <a:lstStyle/>
-          <a:p>
-            <a:r>
-              <a:rPr lang="en-US" dirty="0"/>
-              <a:t>Background knowledge</a:t>
-            </a:r>
-          </a:p>
-        </p:txBody>
-      </p:sp>
-      <p:sp>
-        <p:nvSpPr>
-          <p:cNvPr id="4" name="Content Placeholder 2"/>
-          <p:cNvSpPr>
-            <a:spLocks noGrp="1"/>
-          </p:cNvSpPr>
-          <p:nvPr>
-            <p:ph idx="1"/>
-          </p:nvPr>
-        </p:nvSpPr>
-        <p:spPr>
-          <a:xfrm>
-            <a:off x="477464" y="1044422"/>
-            <a:ext cx="5316846" cy="672412"/>
-          </a:xfrm>
-        </p:spPr>
-        <p:txBody>
-          <a:bodyPr/>
-          <a:lstStyle/>
-          <a:p>
-            <a:pPr>
-              <a:buFont typeface="Wingdings" panose="05000000000000000000" pitchFamily="2" charset="2"/>
-              <a:buChar char="q"/>
-            </a:pPr>
-            <a:r>
-              <a:rPr lang="en-US" dirty="0"/>
-              <a:t>Object Oriented Programming</a:t>
-            </a:r>
-          </a:p>
-        </p:txBody>
-      </p:sp>
-      <p:graphicFrame>
-        <p:nvGraphicFramePr>
-          <p:cNvPr id="5" name="Diagram 4"/>
-          <p:cNvGraphicFramePr/>
-          <p:nvPr>
-            <p:extLst>
-              <p:ext uri="{D42A27DB-BD31-4B8C-83A1-F6EECF244321}">
-                <p14:modId xmlns:p14="http://schemas.microsoft.com/office/powerpoint/2010/main" val="2418033946"/>
-              </p:ext>
-            </p:extLst>
-          </p:nvPr>
-        </p:nvGraphicFramePr>
-        <p:xfrm>
-          <a:off x="477464" y="2011680"/>
-          <a:ext cx="5486400" cy="3657600"/>
-        </p:xfrm>
-        <a:graphic>
-          <a:graphicData uri="http://schemas.openxmlformats.org/drawingml/2006/diagram">
-            <dgm:relIds xmlns:dgm="http://schemas.openxmlformats.org/drawingml/2006/diagram" xmlns:r="http://schemas.openxmlformats.org/officeDocument/2006/relationships" r:dm="rId2" r:lo="rId3" r:qs="rId4" r:cs="rId5"/>
-          </a:graphicData>
-        </a:graphic>
-      </p:graphicFrame>
-      <p:sp>
-        <p:nvSpPr>
-          <p:cNvPr id="8" name="Thought Bubble: Cloud 7"/>
-          <p:cNvSpPr/>
-          <p:nvPr/>
-        </p:nvSpPr>
-        <p:spPr>
-          <a:xfrm>
-            <a:off x="7408507" y="946338"/>
-            <a:ext cx="3312368" cy="2286607"/>
-          </a:xfrm>
-          <a:prstGeom prst="cloudCallout">
-            <a:avLst>
-              <a:gd name="adj1" fmla="val -26633"/>
-              <a:gd name="adj2" fmla="val 68621"/>
-            </a:avLst>
-          </a:prstGeom>
-        </p:spPr>
-        <p:style>
-          <a:lnRef idx="2">
-            <a:schemeClr val="accent1">
-              <a:shade val="50000"/>
-            </a:schemeClr>
-          </a:lnRef>
-          <a:fillRef idx="1">
-            <a:schemeClr val="accent1"/>
-          </a:fillRef>
-          <a:effectRef idx="0">
-            <a:schemeClr val="accent1"/>
-          </a:effectRef>
-          <a:fontRef idx="minor">
-            <a:schemeClr val="lt1"/>
-          </a:fontRef>
-        </p:style>
-        <p:txBody>
-          <a:bodyPr rtlCol="0" anchor="ctr"/>
-          <a:lstStyle/>
-          <a:p>
-            <a:pPr marL="285750" indent="-285750">
-              <a:buFont typeface="Wingdings" panose="05000000000000000000" pitchFamily="2" charset="2"/>
-              <a:buChar char="ü"/>
-            </a:pPr>
-            <a:r>
-              <a:rPr lang="en-US" sz="1400" dirty="0">
-                <a:latin typeface="Century Gothic" panose="020B0502020202020204" pitchFamily="34" charset="0"/>
-              </a:rPr>
-              <a:t>Condition: text, date time, number…</a:t>
-            </a:r>
-          </a:p>
-        </p:txBody>
-      </p:sp>
-      <p:pic>
-        <p:nvPicPr>
-          <p:cNvPr id="9" name="Picture 8"/>
-          <p:cNvPicPr>
-            <a:picLocks noChangeAspect="1"/>
-          </p:cNvPicPr>
-          <p:nvPr/>
-        </p:nvPicPr>
-        <p:blipFill>
-          <a:blip r:embed="rId7">
-            <a:extLst>
-              <a:ext uri="{28A0092B-C50C-407E-A947-70E740481C1C}">
-                <a14:useLocalDpi xmlns:a14="http://schemas.microsoft.com/office/drawing/2010/main" val="0"/>
-              </a:ext>
-            </a:extLst>
-          </a:blip>
-          <a:stretch>
-            <a:fillRect/>
-          </a:stretch>
-        </p:blipFill>
-        <p:spPr>
-          <a:xfrm>
-            <a:off x="6323847" y="3453486"/>
-            <a:ext cx="2362200" cy="2362200"/>
-          </a:xfrm>
-          <a:prstGeom prst="rect">
-            <a:avLst/>
-          </a:prstGeom>
-        </p:spPr>
-      </p:pic>
-    </p:spTree>
-    <p:extLst>
-      <p:ext uri="{BB962C8B-B14F-4D97-AF65-F5344CB8AC3E}">
-        <p14:creationId xmlns:p14="http://schemas.microsoft.com/office/powerpoint/2010/main" val="4060563675"/>
       </p:ext>
     </p:extLst>
   </p:cSld>
@@ -45061,13 +45305,13 @@
 
 <file path=customXml/item1.xml><?xml version="1.0" encoding="utf-8"?>
 <Control xmlns="http://schemas.microsoft.com/VisualStudio/2011/storyboarding/control">
-  <Id Name="System.Storyboarding.WindowsPhone.Tile" Revision="1" Stencil="System.Storyboarding.WindowsPhone" StencilVersion="0.1"/>
+  <Id Name="3be9aa63-ceb5-4aa2-a098-47294c212850" Revision="1" Stencil="System.MyShapes" StencilVersion="1.0"/>
 </Control>
 </file>
 
 <file path=customXml/item10.xml><?xml version="1.0" encoding="utf-8"?>
 <Control xmlns="http://schemas.microsoft.com/VisualStudio/2011/storyboarding/control">
-  <Id Name="3be9aa63-ceb5-4aa2-a098-47294c212850" Revision="1" Stencil="System.MyShapes" StencilVersion="1.0"/>
+  <Id Name="System.Storyboarding.WindowsPhone.Tile" Revision="1" Stencil="System.Storyboarding.WindowsPhone" StencilVersion="0.1"/>
 </Control>
 </file>
 
@@ -45079,37 +45323,37 @@
 
 <file path=customXml/item12.xml><?xml version="1.0" encoding="utf-8"?>
 <Control xmlns="http://schemas.microsoft.com/VisualStudio/2011/storyboarding/control">
-  <Id Name="3be9aa63-ceb5-4aa2-a098-47294c212850" Revision="1" Stencil="System.MyShapes" StencilVersion="1.0"/>
+  <Id Name="System.Storyboarding.WindowsPhone.WideTile" Revision="1" Stencil="System.Storyboarding.WindowsPhone" StencilVersion="0.1"/>
 </Control>
 </file>
 
 <file path=customXml/item13.xml><?xml version="1.0" encoding="utf-8"?>
 <Control xmlns="http://schemas.microsoft.com/VisualStudio/2011/storyboarding/control">
-  <Id Name="System.Storyboarding.WindowsPhone.WideTile" Revision="1" Stencil="System.Storyboarding.WindowsPhone" StencilVersion="0.1"/>
+  <Id Name="System.Storyboarding.Common.Text" Revision="1" Stencil="System.Storyboarding.Common" StencilVersion="0.1"/>
 </Control>
 </file>
 
 <file path=customXml/item14.xml><?xml version="1.0" encoding="utf-8"?>
 <Control xmlns="http://schemas.microsoft.com/VisualStudio/2011/storyboarding/control">
-  <Id Name="System.Storyboarding.WindowsPhone.Tile" Revision="1" Stencil="System.Storyboarding.WindowsPhone" StencilVersion="0.1"/>
+  <Id Name="System.Storyboarding.Icons.User" Revision="1" Stencil="System.Storyboarding.Icons" StencilVersion="0.1"/>
 </Control>
 </file>
 
 <file path=customXml/item15.xml><?xml version="1.0" encoding="utf-8"?>
 <Control xmlns="http://schemas.microsoft.com/VisualStudio/2011/storyboarding/control">
-  <Id Name="System.Storyboarding.WindowsPhone.Tile" Revision="1" Stencil="System.Storyboarding.WindowsPhone" StencilVersion="0.1"/>
+  <Id Name="3be9aa63-ceb5-4aa2-a098-47294c212850" Revision="1" Stencil="System.MyShapes" StencilVersion="1.0"/>
 </Control>
 </file>
 
 <file path=customXml/item2.xml><?xml version="1.0" encoding="utf-8"?>
 <Control xmlns="http://schemas.microsoft.com/VisualStudio/2011/storyboarding/control">
-  <Id Name="3be9aa63-ceb5-4aa2-a098-47294c212850" Revision="1" Stencil="System.MyShapes" StencilVersion="1.0"/>
+  <Id Name="System.Storyboarding.WindowsPhone.Tile" Revision="1" Stencil="System.Storyboarding.WindowsPhone" StencilVersion="0.1"/>
 </Control>
 </file>
 
 <file path=customXml/item3.xml><?xml version="1.0" encoding="utf-8"?>
 <Control xmlns="http://schemas.microsoft.com/VisualStudio/2011/storyboarding/control">
-  <Id Name="System.Storyboarding.Common.Text" Revision="1" Stencil="System.Storyboarding.Common" StencilVersion="0.1"/>
+  <Id Name="System.Storyboarding.WindowsPhone.Tile" Revision="1" Stencil="System.Storyboarding.WindowsPhone" StencilVersion="0.1"/>
 </Control>
 </file>
 
@@ -45133,7 +45377,7 @@
 
 <file path=customXml/item7.xml><?xml version="1.0" encoding="utf-8"?>
 <Control xmlns="http://schemas.microsoft.com/VisualStudio/2011/storyboarding/control">
-  <Id Name="System.Storyboarding.Icons.User" Revision="1" Stencil="System.Storyboarding.Icons" StencilVersion="0.1"/>
+  <Id Name="3be9aa63-ceb5-4aa2-a098-47294c212850" Revision="1" Stencil="System.MyShapes" StencilVersion="1.0"/>
 </Control>
 </file>
 
@@ -45150,6 +45394,62 @@
 </file>
 
 <file path=customXml/itemProps1.xml><?xml version="1.0" encoding="utf-8"?>
+<ds:datastoreItem xmlns:ds="http://schemas.openxmlformats.org/officeDocument/2006/customXml" ds:itemID="{AA42C71F-E3FE-4165-B8A4-CABE88AC82A2}">
+  <ds:schemaRefs>
+    <ds:schemaRef ds:uri="http://schemas.microsoft.com/VisualStudio/2011/storyboarding/control"/>
+  </ds:schemaRefs>
+</ds:datastoreItem>
+</file>
+
+<file path=customXml/itemProps10.xml><?xml version="1.0" encoding="utf-8"?>
+<ds:datastoreItem xmlns:ds="http://schemas.openxmlformats.org/officeDocument/2006/customXml" ds:itemID="{54096EDF-8844-4AF1-A245-67F5F80754AD}">
+  <ds:schemaRefs>
+    <ds:schemaRef ds:uri="http://schemas.microsoft.com/VisualStudio/2011/storyboarding/control"/>
+  </ds:schemaRefs>
+</ds:datastoreItem>
+</file>
+
+<file path=customXml/itemProps11.xml><?xml version="1.0" encoding="utf-8"?>
+<ds:datastoreItem xmlns:ds="http://schemas.openxmlformats.org/officeDocument/2006/customXml" ds:itemID="{F8288DEA-22B9-443B-ABE1-014EF687A73A}">
+  <ds:schemaRefs>
+    <ds:schemaRef ds:uri="http://schemas.microsoft.com/VisualStudio/2011/storyboarding/control"/>
+  </ds:schemaRefs>
+</ds:datastoreItem>
+</file>
+
+<file path=customXml/itemProps12.xml><?xml version="1.0" encoding="utf-8"?>
+<ds:datastoreItem xmlns:ds="http://schemas.openxmlformats.org/officeDocument/2006/customXml" ds:itemID="{5F8B743C-58C9-496B-861D-37CFDCB689D2}">
+  <ds:schemaRefs>
+    <ds:schemaRef ds:uri="http://schemas.microsoft.com/VisualStudio/2011/storyboarding/control"/>
+  </ds:schemaRefs>
+</ds:datastoreItem>
+</file>
+
+<file path=customXml/itemProps13.xml><?xml version="1.0" encoding="utf-8"?>
+<ds:datastoreItem xmlns:ds="http://schemas.openxmlformats.org/officeDocument/2006/customXml" ds:itemID="{CCE23676-7212-4FCA-ABFB-70FF7FF618C0}">
+  <ds:schemaRefs>
+    <ds:schemaRef ds:uri="http://schemas.microsoft.com/VisualStudio/2011/storyboarding/control"/>
+  </ds:schemaRefs>
+</ds:datastoreItem>
+</file>
+
+<file path=customXml/itemProps14.xml><?xml version="1.0" encoding="utf-8"?>
+<ds:datastoreItem xmlns:ds="http://schemas.openxmlformats.org/officeDocument/2006/customXml" ds:itemID="{2D71B260-49DD-430A-993F-35BB818160D2}">
+  <ds:schemaRefs>
+    <ds:schemaRef ds:uri="http://schemas.microsoft.com/VisualStudio/2011/storyboarding/control"/>
+  </ds:schemaRefs>
+</ds:datastoreItem>
+</file>
+
+<file path=customXml/itemProps15.xml><?xml version="1.0" encoding="utf-8"?>
+<ds:datastoreItem xmlns:ds="http://schemas.openxmlformats.org/officeDocument/2006/customXml" ds:itemID="{5C77F33C-55C9-42D6-934B-7D496227429B}">
+  <ds:schemaRefs>
+    <ds:schemaRef ds:uri="http://schemas.microsoft.com/VisualStudio/2011/storyboarding/control"/>
+  </ds:schemaRefs>
+</ds:datastoreItem>
+</file>
+
+<file path=customXml/itemProps2.xml><?xml version="1.0" encoding="utf-8"?>
 <ds:datastoreItem xmlns:ds="http://schemas.openxmlformats.org/officeDocument/2006/customXml" ds:itemID="{A56E7BBF-4AD1-4BAB-BB90-656BC303E394}">
   <ds:schemaRefs>
     <ds:schemaRef ds:uri="http://schemas.microsoft.com/VisualStudio/2011/storyboarding/control"/>
@@ -45157,64 +45457,8 @@
 </ds:datastoreItem>
 </file>
 
-<file path=customXml/itemProps10.xml><?xml version="1.0" encoding="utf-8"?>
-<ds:datastoreItem xmlns:ds="http://schemas.openxmlformats.org/officeDocument/2006/customXml" ds:itemID="{FCA7C4E3-CA2C-4359-96E4-C457BB4E74BB}">
-  <ds:schemaRefs>
-    <ds:schemaRef ds:uri="http://schemas.microsoft.com/VisualStudio/2011/storyboarding/control"/>
-  </ds:schemaRefs>
-</ds:datastoreItem>
-</file>
-
-<file path=customXml/itemProps11.xml><?xml version="1.0" encoding="utf-8"?>
-<ds:datastoreItem xmlns:ds="http://schemas.openxmlformats.org/officeDocument/2006/customXml" ds:itemID="{227E5C53-C01D-4E70-A6B9-862CEA9643DB}">
-  <ds:schemaRefs>
-    <ds:schemaRef ds:uri="http://schemas.microsoft.com/VisualStudio/2011/storyboarding/control"/>
-  </ds:schemaRefs>
-</ds:datastoreItem>
-</file>
-
-<file path=customXml/itemProps12.xml><?xml version="1.0" encoding="utf-8"?>
-<ds:datastoreItem xmlns:ds="http://schemas.openxmlformats.org/officeDocument/2006/customXml" ds:itemID="{5C77F33C-55C9-42D6-934B-7D496227429B}">
-  <ds:schemaRefs>
-    <ds:schemaRef ds:uri="http://schemas.microsoft.com/VisualStudio/2011/storyboarding/control"/>
-  </ds:schemaRefs>
-</ds:datastoreItem>
-</file>
-
-<file path=customXml/itemProps13.xml><?xml version="1.0" encoding="utf-8"?>
-<ds:datastoreItem xmlns:ds="http://schemas.openxmlformats.org/officeDocument/2006/customXml" ds:itemID="{5F8B743C-58C9-496B-861D-37CFDCB689D2}">
-  <ds:schemaRefs>
-    <ds:schemaRef ds:uri="http://schemas.microsoft.com/VisualStudio/2011/storyboarding/control"/>
-  </ds:schemaRefs>
-</ds:datastoreItem>
-</file>
-
-<file path=customXml/itemProps14.xml><?xml version="1.0" encoding="utf-8"?>
-<ds:datastoreItem xmlns:ds="http://schemas.openxmlformats.org/officeDocument/2006/customXml" ds:itemID="{54096EDF-8844-4AF1-A245-67F5F80754AD}">
-  <ds:schemaRefs>
-    <ds:schemaRef ds:uri="http://schemas.microsoft.com/VisualStudio/2011/storyboarding/control"/>
-  </ds:schemaRefs>
-</ds:datastoreItem>
-</file>
-
-<file path=customXml/itemProps15.xml><?xml version="1.0" encoding="utf-8"?>
-<ds:datastoreItem xmlns:ds="http://schemas.openxmlformats.org/officeDocument/2006/customXml" ds:itemID="{864CECF6-9DCA-4D1C-9B38-E0688ABC9BEF}">
-  <ds:schemaRefs>
-    <ds:schemaRef ds:uri="http://schemas.microsoft.com/VisualStudio/2011/storyboarding/control"/>
-  </ds:schemaRefs>
-</ds:datastoreItem>
-</file>
-
-<file path=customXml/itemProps2.xml><?xml version="1.0" encoding="utf-8"?>
-<ds:datastoreItem xmlns:ds="http://schemas.openxmlformats.org/officeDocument/2006/customXml" ds:itemID="{AA42C71F-E3FE-4165-B8A4-CABE88AC82A2}">
-  <ds:schemaRefs>
-    <ds:schemaRef ds:uri="http://schemas.microsoft.com/VisualStudio/2011/storyboarding/control"/>
-  </ds:schemaRefs>
-</ds:datastoreItem>
-</file>
-
 <file path=customXml/itemProps3.xml><?xml version="1.0" encoding="utf-8"?>
-<ds:datastoreItem xmlns:ds="http://schemas.openxmlformats.org/officeDocument/2006/customXml" ds:itemID="{CCE23676-7212-4FCA-ABFB-70FF7FF618C0}">
+<ds:datastoreItem xmlns:ds="http://schemas.openxmlformats.org/officeDocument/2006/customXml" ds:itemID="{B86ED811-76FA-470E-BF65-7B08F4E478BD}">
   <ds:schemaRefs>
     <ds:schemaRef ds:uri="http://schemas.microsoft.com/VisualStudio/2011/storyboarding/control"/>
   </ds:schemaRefs>
@@ -45222,7 +45466,7 @@
 </file>
 
 <file path=customXml/itemProps4.xml><?xml version="1.0" encoding="utf-8"?>
-<ds:datastoreItem xmlns:ds="http://schemas.openxmlformats.org/officeDocument/2006/customXml" ds:itemID="{8376A45C-3B73-430A-AB07-14AE228ECB55}">
+<ds:datastoreItem xmlns:ds="http://schemas.openxmlformats.org/officeDocument/2006/customXml" ds:itemID="{227E5C53-C01D-4E70-A6B9-862CEA9643DB}">
   <ds:schemaRefs>
     <ds:schemaRef ds:uri="http://schemas.microsoft.com/VisualStudio/2011/storyboarding/control"/>
   </ds:schemaRefs>
@@ -45238,7 +45482,7 @@
 </file>
 
 <file path=customXml/itemProps6.xml><?xml version="1.0" encoding="utf-8"?>
-<ds:datastoreItem xmlns:ds="http://schemas.openxmlformats.org/officeDocument/2006/customXml" ds:itemID="{B86ED811-76FA-470E-BF65-7B08F4E478BD}">
+<ds:datastoreItem xmlns:ds="http://schemas.openxmlformats.org/officeDocument/2006/customXml" ds:itemID="{864CECF6-9DCA-4D1C-9B38-E0688ABC9BEF}">
   <ds:schemaRefs>
     <ds:schemaRef ds:uri="http://schemas.microsoft.com/VisualStudio/2011/storyboarding/control"/>
   </ds:schemaRefs>
@@ -45246,7 +45490,7 @@
 </file>
 
 <file path=customXml/itemProps7.xml><?xml version="1.0" encoding="utf-8"?>
-<ds:datastoreItem xmlns:ds="http://schemas.openxmlformats.org/officeDocument/2006/customXml" ds:itemID="{2D71B260-49DD-430A-993F-35BB818160D2}">
+<ds:datastoreItem xmlns:ds="http://schemas.openxmlformats.org/officeDocument/2006/customXml" ds:itemID="{FCA7C4E3-CA2C-4359-96E4-C457BB4E74BB}">
   <ds:schemaRefs>
     <ds:schemaRef ds:uri="http://schemas.microsoft.com/VisualStudio/2011/storyboarding/control"/>
   </ds:schemaRefs>
@@ -45254,7 +45498,7 @@
 </file>
 
 <file path=customXml/itemProps8.xml><?xml version="1.0" encoding="utf-8"?>
-<ds:datastoreItem xmlns:ds="http://schemas.openxmlformats.org/officeDocument/2006/customXml" ds:itemID="{F8288DEA-22B9-443B-ABE1-014EF687A73A}">
+<ds:datastoreItem xmlns:ds="http://schemas.openxmlformats.org/officeDocument/2006/customXml" ds:itemID="{8376A45C-3B73-430A-AB07-14AE228ECB55}">
   <ds:schemaRefs>
     <ds:schemaRef ds:uri="http://schemas.microsoft.com/VisualStudio/2011/storyboarding/control"/>
   </ds:schemaRefs>

</xml_diff>